<commit_message>
text error in image for ItomSharedSemaphore
</commit_message>
<xml_diff>
--- a/docs/userDoc/source/07_plugins/development/images/itomSharedSemaphore.pptx
+++ b/docs/userDoc/source/07_plugins/development/images/itomSharedSemaphore.pptx
@@ -289,7 +289,7 @@
           <a:p>
             <a:fld id="{7465710E-CDF5-4AD3-AEAF-836F6EC3A155}" type="datetimeFigureOut">
               <a:rPr lang="en-US" smtClean="0"/>
-              <a:t>6/13/2013</a:t>
+              <a:t>8/2/2013</a:t>
             </a:fld>
             <a:endParaRPr lang="en-US"/>
           </a:p>
@@ -459,7 +459,7 @@
           <a:p>
             <a:fld id="{7465710E-CDF5-4AD3-AEAF-836F6EC3A155}" type="datetimeFigureOut">
               <a:rPr lang="en-US" smtClean="0"/>
-              <a:t>6/13/2013</a:t>
+              <a:t>8/2/2013</a:t>
             </a:fld>
             <a:endParaRPr lang="en-US"/>
           </a:p>
@@ -639,7 +639,7 @@
           <a:p>
             <a:fld id="{7465710E-CDF5-4AD3-AEAF-836F6EC3A155}" type="datetimeFigureOut">
               <a:rPr lang="en-US" smtClean="0"/>
-              <a:t>6/13/2013</a:t>
+              <a:t>8/2/2013</a:t>
             </a:fld>
             <a:endParaRPr lang="en-US"/>
           </a:p>
@@ -809,7 +809,7 @@
           <a:p>
             <a:fld id="{7465710E-CDF5-4AD3-AEAF-836F6EC3A155}" type="datetimeFigureOut">
               <a:rPr lang="en-US" smtClean="0"/>
-              <a:t>6/13/2013</a:t>
+              <a:t>8/2/2013</a:t>
             </a:fld>
             <a:endParaRPr lang="en-US"/>
           </a:p>
@@ -1055,7 +1055,7 @@
           <a:p>
             <a:fld id="{7465710E-CDF5-4AD3-AEAF-836F6EC3A155}" type="datetimeFigureOut">
               <a:rPr lang="en-US" smtClean="0"/>
-              <a:t>6/13/2013</a:t>
+              <a:t>8/2/2013</a:t>
             </a:fld>
             <a:endParaRPr lang="en-US"/>
           </a:p>
@@ -1343,7 +1343,7 @@
           <a:p>
             <a:fld id="{7465710E-CDF5-4AD3-AEAF-836F6EC3A155}" type="datetimeFigureOut">
               <a:rPr lang="en-US" smtClean="0"/>
-              <a:t>6/13/2013</a:t>
+              <a:t>8/2/2013</a:t>
             </a:fld>
             <a:endParaRPr lang="en-US"/>
           </a:p>
@@ -1765,7 +1765,7 @@
           <a:p>
             <a:fld id="{7465710E-CDF5-4AD3-AEAF-836F6EC3A155}" type="datetimeFigureOut">
               <a:rPr lang="en-US" smtClean="0"/>
-              <a:t>6/13/2013</a:t>
+              <a:t>8/2/2013</a:t>
             </a:fld>
             <a:endParaRPr lang="en-US"/>
           </a:p>
@@ -1883,7 +1883,7 @@
           <a:p>
             <a:fld id="{7465710E-CDF5-4AD3-AEAF-836F6EC3A155}" type="datetimeFigureOut">
               <a:rPr lang="en-US" smtClean="0"/>
-              <a:t>6/13/2013</a:t>
+              <a:t>8/2/2013</a:t>
             </a:fld>
             <a:endParaRPr lang="en-US"/>
           </a:p>
@@ -1978,7 +1978,7 @@
           <a:p>
             <a:fld id="{7465710E-CDF5-4AD3-AEAF-836F6EC3A155}" type="datetimeFigureOut">
               <a:rPr lang="en-US" smtClean="0"/>
-              <a:t>6/13/2013</a:t>
+              <a:t>8/2/2013</a:t>
             </a:fld>
             <a:endParaRPr lang="en-US"/>
           </a:p>
@@ -2255,7 +2255,7 @@
           <a:p>
             <a:fld id="{7465710E-CDF5-4AD3-AEAF-836F6EC3A155}" type="datetimeFigureOut">
               <a:rPr lang="en-US" smtClean="0"/>
-              <a:t>6/13/2013</a:t>
+              <a:t>8/2/2013</a:t>
             </a:fld>
             <a:endParaRPr lang="en-US"/>
           </a:p>
@@ -2508,7 +2508,7 @@
           <a:p>
             <a:fld id="{7465710E-CDF5-4AD3-AEAF-836F6EC3A155}" type="datetimeFigureOut">
               <a:rPr lang="en-US" smtClean="0"/>
-              <a:t>6/13/2013</a:t>
+              <a:t>8/2/2013</a:t>
             </a:fld>
             <a:endParaRPr lang="en-US"/>
           </a:p>
@@ -2721,7 +2721,7 @@
           <a:p>
             <a:fld id="{7465710E-CDF5-4AD3-AEAF-836F6EC3A155}" type="datetimeFigureOut">
               <a:rPr lang="en-US" smtClean="0"/>
-              <a:t>6/13/2013</a:t>
+              <a:t>8/2/2013</a:t>
             </a:fld>
             <a:endParaRPr lang="en-US"/>
           </a:p>
@@ -3951,7 +3951,15 @@
           <a:p>
             <a:r>
               <a:rPr lang="en-US" sz="1000" dirty="0"/>
-              <a:t>… if you are done, release and the semaphore (if one is provided):</a:t>
+              <a:t>… if you are done, </a:t>
+            </a:r>
+            <a:r>
+              <a:rPr lang="en-US" sz="1000" dirty="0" smtClean="0"/>
+              <a:t>release </a:t>
+            </a:r>
+            <a:r>
+              <a:rPr lang="en-US" sz="1000" dirty="0"/>
+              <a:t>the semaphore (if one is provided):</a:t>
             </a:r>
           </a:p>
           <a:p>
@@ -4018,8 +4026,13 @@
             </a:r>
             <a:r>
               <a:rPr lang="en-US" sz="1000" b="1" dirty="0"/>
-              <a:t>-&gt;release();</a:t>
-            </a:r>
+              <a:t>-&gt;release</a:t>
+            </a:r>
+            <a:r>
+              <a:rPr lang="en-US" sz="1000" b="1" dirty="0" smtClean="0"/>
+              <a:t>();</a:t>
+            </a:r>
+            <a:endParaRPr lang="en-US" sz="1000" b="1" dirty="0"/>
           </a:p>
           <a:p>
             <a:r>
@@ -4218,8 +4231,8 @@
         </p:nvSpPr>
         <p:spPr>
           <a:xfrm>
-            <a:off x="525083" y="4891808"/>
-            <a:ext cx="2466020" cy="708251"/>
+            <a:off x="525083" y="4891809"/>
+            <a:ext cx="2466020" cy="553416"/>
           </a:xfrm>
           <a:prstGeom prst="rect">
             <a:avLst/>
@@ -4257,7 +4270,7 @@
         <p:spPr>
           <a:xfrm>
             <a:off x="526664" y="5015283"/>
-            <a:ext cx="2312599" cy="707878"/>
+            <a:ext cx="2312599" cy="553990"/>
           </a:xfrm>
           <a:prstGeom prst="rect">
             <a:avLst/>
@@ -4278,11 +4291,11 @@
           <a:p>
             <a:r>
               <a:rPr lang="en-US" sz="1000" dirty="0" err="1" smtClean="0"/>
-              <a:t>ItomSharedSemaphore</a:t>
+              <a:t>waitCond</a:t>
             </a:r>
             <a:r>
               <a:rPr lang="en-US" sz="1000" dirty="0" smtClean="0"/>
-              <a:t>-&gt; </a:t>
+              <a:t>-&gt;</a:t>
             </a:r>
             <a:r>
               <a:rPr lang="en-US" sz="1000" dirty="0" err="1" smtClean="0"/>
@@ -4290,16 +4303,9 @@
             </a:r>
             <a:r>
               <a:rPr lang="en-US" sz="1000" dirty="0" smtClean="0"/>
-              <a:t>(</a:t>
-            </a:r>
-            <a:r>
-              <a:rPr lang="en-US" sz="1000" dirty="0" err="1" smtClean="0"/>
-              <a:t>waitCond</a:t>
-            </a:r>
-            <a:r>
-              <a:rPr lang="en-US" sz="1000" dirty="0"/>
-              <a:t>);</a:t>
-            </a:r>
+              <a:t>();</a:t>
+            </a:r>
+            <a:endParaRPr lang="en-US" sz="1000" dirty="0"/>
           </a:p>
           <a:p>
             <a:endParaRPr lang="en-US" sz="1000" dirty="0"/>

</xml_diff>